<commit_message>
data analysis to choose t, create Xagg
</commit_message>
<xml_diff>
--- a/meetings/11-06-2025.pptx
+++ b/meetings/11-06-2025.pptx
@@ -6,7 +6,9 @@
   </p:sldMasterIdLst>
   <p:sldIdLst>
     <p:sldId id="256" r:id="rId2"/>
-    <p:sldId id="257" r:id="rId3"/>
+    <p:sldId id="258" r:id="rId3"/>
+    <p:sldId id="259" r:id="rId4"/>
+    <p:sldId id="260" r:id="rId5"/>
   </p:sldIdLst>
   <p:sldSz cx="12192000" cy="6858000"/>
   <p:notesSz cx="6858000" cy="9144000"/>
@@ -105,6 +107,11 @@
       </a:defRPr>
     </a:lvl9pPr>
   </p:defaultTextStyle>
+  <p:extLst>
+    <p:ext uri="{EFAFB233-063F-42B5-8137-9DF3F51BA10A}">
+      <p15:sldGuideLst xmlns:p15="http://schemas.microsoft.com/office/powerpoint/2012/main"/>
+    </p:ext>
+  </p:extLst>
 </p:presentation>
 </file>
 
@@ -254,7 +261,7 @@
           <a:lstStyle/>
           <a:p>
             <a:fld id="{E117FB66-66F9-BF46-97A3-FB400C3CFD44}" type="datetimeFigureOut">
-              <a:t>11/4/25</a:t>
+              <a:t>11/6/25</a:t>
             </a:fld>
             <a:endParaRPr lang="en-US"/>
           </a:p>
@@ -450,7 +457,7 @@
           <a:lstStyle/>
           <a:p>
             <a:fld id="{E117FB66-66F9-BF46-97A3-FB400C3CFD44}" type="datetimeFigureOut">
-              <a:t>11/4/25</a:t>
+              <a:t>11/6/25</a:t>
             </a:fld>
             <a:endParaRPr lang="en-US"/>
           </a:p>
@@ -656,7 +663,7 @@
           <a:lstStyle/>
           <a:p>
             <a:fld id="{E117FB66-66F9-BF46-97A3-FB400C3CFD44}" type="datetimeFigureOut">
-              <a:t>11/4/25</a:t>
+              <a:t>11/6/25</a:t>
             </a:fld>
             <a:endParaRPr lang="en-US"/>
           </a:p>
@@ -852,7 +859,7 @@
           <a:lstStyle/>
           <a:p>
             <a:fld id="{E117FB66-66F9-BF46-97A3-FB400C3CFD44}" type="datetimeFigureOut">
-              <a:t>11/4/25</a:t>
+              <a:t>11/6/25</a:t>
             </a:fld>
             <a:endParaRPr lang="en-US"/>
           </a:p>
@@ -1125,7 +1132,7 @@
           <a:lstStyle/>
           <a:p>
             <a:fld id="{E117FB66-66F9-BF46-97A3-FB400C3CFD44}" type="datetimeFigureOut">
-              <a:t>11/4/25</a:t>
+              <a:t>11/6/25</a:t>
             </a:fld>
             <a:endParaRPr lang="en-US"/>
           </a:p>
@@ -1388,7 +1395,7 @@
           <a:lstStyle/>
           <a:p>
             <a:fld id="{E117FB66-66F9-BF46-97A3-FB400C3CFD44}" type="datetimeFigureOut">
-              <a:t>11/4/25</a:t>
+              <a:t>11/6/25</a:t>
             </a:fld>
             <a:endParaRPr lang="en-US"/>
           </a:p>
@@ -1798,7 +1805,7 @@
           <a:lstStyle/>
           <a:p>
             <a:fld id="{E117FB66-66F9-BF46-97A3-FB400C3CFD44}" type="datetimeFigureOut">
-              <a:t>11/4/25</a:t>
+              <a:t>11/6/25</a:t>
             </a:fld>
             <a:endParaRPr lang="en-US"/>
           </a:p>
@@ -1937,7 +1944,7 @@
           <a:lstStyle/>
           <a:p>
             <a:fld id="{E117FB66-66F9-BF46-97A3-FB400C3CFD44}" type="datetimeFigureOut">
-              <a:t>11/4/25</a:t>
+              <a:t>11/6/25</a:t>
             </a:fld>
             <a:endParaRPr lang="en-US"/>
           </a:p>
@@ -2048,7 +2055,7 @@
           <a:lstStyle/>
           <a:p>
             <a:fld id="{E117FB66-66F9-BF46-97A3-FB400C3CFD44}" type="datetimeFigureOut">
-              <a:t>11/4/25</a:t>
+              <a:t>11/6/25</a:t>
             </a:fld>
             <a:endParaRPr lang="en-US"/>
           </a:p>
@@ -2357,7 +2364,7 @@
           <a:lstStyle/>
           <a:p>
             <a:fld id="{E117FB66-66F9-BF46-97A3-FB400C3CFD44}" type="datetimeFigureOut">
-              <a:t>11/4/25</a:t>
+              <a:t>11/6/25</a:t>
             </a:fld>
             <a:endParaRPr lang="en-US"/>
           </a:p>
@@ -2643,7 +2650,7 @@
           <a:lstStyle/>
           <a:p>
             <a:fld id="{E117FB66-66F9-BF46-97A3-FB400C3CFD44}" type="datetimeFigureOut">
-              <a:t>11/4/25</a:t>
+              <a:t>11/6/25</a:t>
             </a:fld>
             <a:endParaRPr lang="en-US"/>
           </a:p>
@@ -2882,7 +2889,7 @@
           </a:lstStyle>
           <a:p>
             <a:fld id="{E117FB66-66F9-BF46-97A3-FB400C3CFD44}" type="datetimeFigureOut">
-              <a:t>11/4/25</a:t>
+              <a:t>11/6/25</a:t>
             </a:fld>
             <a:endParaRPr lang="en-US"/>
           </a:p>
@@ -3384,21 +3391,605 @@
           <a:chExt cx="0" cy="0"/>
         </a:xfrm>
       </p:grpSpPr>
+      <p:sp>
+        <p:nvSpPr>
+          <p:cNvPr id="4" name="Rounded Rectangle 3">
+            <a:extLst>
+              <a:ext uri="{FF2B5EF4-FFF2-40B4-BE49-F238E27FC236}">
+                <a16:creationId xmlns:a16="http://schemas.microsoft.com/office/drawing/2014/main" id="{6F932759-7768-2C17-DEE5-FA9088FFB2F2}"/>
+              </a:ext>
+            </a:extLst>
+          </p:cNvPr>
+          <p:cNvSpPr/>
+          <p:nvPr/>
+        </p:nvSpPr>
+        <p:spPr>
+          <a:xfrm>
+            <a:off x="694481" y="300941"/>
+            <a:ext cx="5231757" cy="6192455"/>
+          </a:xfrm>
+          <a:prstGeom prst="roundRect">
+            <a:avLst>
+              <a:gd name="adj" fmla="val 4708"/>
+            </a:avLst>
+          </a:prstGeom>
+          <a:solidFill>
+            <a:schemeClr val="accent4">
+              <a:lumMod val="20000"/>
+              <a:lumOff val="80000"/>
+            </a:schemeClr>
+          </a:solidFill>
+          <a:ln>
+            <a:solidFill>
+              <a:schemeClr val="accent4">
+                <a:lumMod val="60000"/>
+                <a:lumOff val="40000"/>
+              </a:schemeClr>
+            </a:solidFill>
+          </a:ln>
+        </p:spPr>
+        <p:style>
+          <a:lnRef idx="2">
+            <a:schemeClr val="accent1">
+              <a:shade val="15000"/>
+            </a:schemeClr>
+          </a:lnRef>
+          <a:fillRef idx="1">
+            <a:schemeClr val="accent1"/>
+          </a:fillRef>
+          <a:effectRef idx="0">
+            <a:schemeClr val="accent1"/>
+          </a:effectRef>
+          <a:fontRef idx="minor">
+            <a:schemeClr val="lt1"/>
+          </a:fontRef>
+        </p:style>
+        <p:txBody>
+          <a:bodyPr rtlCol="0" anchor="ctr"/>
+          <a:lstStyle/>
+          <a:p>
+            <a:pPr algn="ctr"/>
+            <a:endParaRPr lang="en-US"/>
+          </a:p>
+        </p:txBody>
+      </p:sp>
+      <p:sp>
+        <p:nvSpPr>
+          <p:cNvPr id="5" name="Rounded Rectangle 4">
+            <a:extLst>
+              <a:ext uri="{FF2B5EF4-FFF2-40B4-BE49-F238E27FC236}">
+                <a16:creationId xmlns:a16="http://schemas.microsoft.com/office/drawing/2014/main" id="{B683652B-598E-51DB-8960-46550F87143E}"/>
+              </a:ext>
+            </a:extLst>
+          </p:cNvPr>
+          <p:cNvSpPr/>
+          <p:nvPr/>
+        </p:nvSpPr>
+        <p:spPr>
+          <a:xfrm>
+            <a:off x="6229109" y="332772"/>
+            <a:ext cx="5231757" cy="6192455"/>
+          </a:xfrm>
+          <a:prstGeom prst="roundRect">
+            <a:avLst>
+              <a:gd name="adj" fmla="val 4708"/>
+            </a:avLst>
+          </a:prstGeom>
+          <a:solidFill>
+            <a:schemeClr val="accent6">
+              <a:lumMod val="20000"/>
+              <a:lumOff val="80000"/>
+            </a:schemeClr>
+          </a:solidFill>
+          <a:ln>
+            <a:solidFill>
+              <a:schemeClr val="accent6">
+                <a:lumMod val="60000"/>
+                <a:lumOff val="40000"/>
+              </a:schemeClr>
+            </a:solidFill>
+          </a:ln>
+        </p:spPr>
+        <p:style>
+          <a:lnRef idx="2">
+            <a:schemeClr val="accent1">
+              <a:shade val="15000"/>
+            </a:schemeClr>
+          </a:lnRef>
+          <a:fillRef idx="1">
+            <a:schemeClr val="accent1"/>
+          </a:fillRef>
+          <a:effectRef idx="0">
+            <a:schemeClr val="accent1"/>
+          </a:effectRef>
+          <a:fontRef idx="minor">
+            <a:schemeClr val="lt1"/>
+          </a:fontRef>
+        </p:style>
+        <p:txBody>
+          <a:bodyPr rtlCol="0" anchor="ctr"/>
+          <a:lstStyle/>
+          <a:p>
+            <a:pPr algn="ctr"/>
+            <a:endParaRPr lang="en-US"/>
+          </a:p>
+        </p:txBody>
+      </p:sp>
+      <p:sp>
+        <p:nvSpPr>
+          <p:cNvPr id="6" name="TextBox 5">
+            <a:extLst>
+              <a:ext uri="{FF2B5EF4-FFF2-40B4-BE49-F238E27FC236}">
+                <a16:creationId xmlns:a16="http://schemas.microsoft.com/office/drawing/2014/main" id="{95695366-5228-9571-7F3C-E6EEA132B437}"/>
+              </a:ext>
+            </a:extLst>
+          </p:cNvPr>
+          <p:cNvSpPr txBox="1"/>
+          <p:nvPr/>
+        </p:nvSpPr>
+        <p:spPr>
+          <a:xfrm>
+            <a:off x="856527" y="509286"/>
+            <a:ext cx="1589987" cy="369332"/>
+          </a:xfrm>
+          <a:prstGeom prst="rect">
+            <a:avLst/>
+          </a:prstGeom>
+          <a:noFill/>
+        </p:spPr>
+        <p:txBody>
+          <a:bodyPr wrap="none" rtlCol="0">
+            <a:spAutoFit/>
+          </a:bodyPr>
+          <a:lstStyle/>
+          <a:p>
+            <a:r>
+              <a:rPr lang="en-US" b="1"/>
+              <a:t>Observations</a:t>
+            </a:r>
+          </a:p>
+        </p:txBody>
+      </p:sp>
+      <p:sp>
+        <p:nvSpPr>
+          <p:cNvPr id="7" name="TextBox 6">
+            <a:extLst>
+              <a:ext uri="{FF2B5EF4-FFF2-40B4-BE49-F238E27FC236}">
+                <a16:creationId xmlns:a16="http://schemas.microsoft.com/office/drawing/2014/main" id="{7F5831B7-63FC-520F-6B80-22114AB045C9}"/>
+              </a:ext>
+            </a:extLst>
+          </p:cNvPr>
+          <p:cNvSpPr txBox="1"/>
+          <p:nvPr/>
+        </p:nvSpPr>
+        <p:spPr>
+          <a:xfrm>
+            <a:off x="6460603" y="509286"/>
+            <a:ext cx="1388329" cy="369332"/>
+          </a:xfrm>
+          <a:prstGeom prst="rect">
+            <a:avLst/>
+          </a:prstGeom>
+          <a:noFill/>
+        </p:spPr>
+        <p:txBody>
+          <a:bodyPr wrap="none" rtlCol="0">
+            <a:spAutoFit/>
+          </a:bodyPr>
+          <a:lstStyle/>
+          <a:p>
+            <a:r>
+              <a:rPr lang="en-US" b="1"/>
+              <a:t>Encounters</a:t>
+            </a:r>
+          </a:p>
+        </p:txBody>
+      </p:sp>
+      <p:sp>
+        <p:nvSpPr>
+          <p:cNvPr id="8" name="TextBox 7">
+            <a:extLst>
+              <a:ext uri="{FF2B5EF4-FFF2-40B4-BE49-F238E27FC236}">
+                <a16:creationId xmlns:a16="http://schemas.microsoft.com/office/drawing/2014/main" id="{58055E3C-C1AB-4359-4192-EBBF21791F9F}"/>
+              </a:ext>
+            </a:extLst>
+          </p:cNvPr>
+          <p:cNvSpPr txBox="1"/>
+          <p:nvPr/>
+        </p:nvSpPr>
+        <p:spPr>
+          <a:xfrm>
+            <a:off x="6460603" y="1145893"/>
+            <a:ext cx="4768769" cy="1200329"/>
+          </a:xfrm>
+          <a:prstGeom prst="rect">
+            <a:avLst/>
+          </a:prstGeom>
+          <a:noFill/>
+        </p:spPr>
+        <p:txBody>
+          <a:bodyPr wrap="square" rtlCol="0">
+            <a:spAutoFit/>
+          </a:bodyPr>
+          <a:lstStyle/>
+          <a:p>
+            <a:r>
+              <a:rPr lang="en-US" u="sng"/>
+              <a:t>Examples</a:t>
+            </a:r>
+            <a:r>
+              <a:rPr lang="en-US"/>
+              <a:t>: Encounter for 'check-up’, Outpatient procedure, Follow-up visit (procedure), Telephone encounter (procedure) , etc.</a:t>
+            </a:r>
+          </a:p>
+        </p:txBody>
+      </p:sp>
+      <p:sp>
+        <p:nvSpPr>
+          <p:cNvPr id="11" name="TextBox 10">
+            <a:extLst>
+              <a:ext uri="{FF2B5EF4-FFF2-40B4-BE49-F238E27FC236}">
+                <a16:creationId xmlns:a16="http://schemas.microsoft.com/office/drawing/2014/main" id="{E2BB4EC0-1ABC-213E-2193-579FB7D39576}"/>
+              </a:ext>
+            </a:extLst>
+          </p:cNvPr>
+          <p:cNvSpPr txBox="1"/>
+          <p:nvPr/>
+        </p:nvSpPr>
+        <p:spPr>
+          <a:xfrm>
+            <a:off x="962628" y="1118733"/>
+            <a:ext cx="4768769" cy="1200329"/>
+          </a:xfrm>
+          <a:prstGeom prst="rect">
+            <a:avLst/>
+          </a:prstGeom>
+          <a:noFill/>
+        </p:spPr>
+        <p:txBody>
+          <a:bodyPr wrap="square" rtlCol="0">
+            <a:spAutoFit/>
+          </a:bodyPr>
+          <a:lstStyle/>
+          <a:p>
+            <a:r>
+              <a:rPr lang="en-US" u="sng"/>
+              <a:t>Examples</a:t>
+            </a:r>
+            <a:r>
+              <a:rPr lang="en-US"/>
+              <a:t>: 1</a:t>
+            </a:r>
+          </a:p>
+          <a:p>
+            <a:r>
+              <a:rPr lang="en-US"/>
+              <a:t>Body Height, BMI, Heart Rate, Systolic Blood Pressure, Triglycerides, Total Cholesterol, Heart Rate, etc.</a:t>
+            </a:r>
+          </a:p>
+        </p:txBody>
+      </p:sp>
+      <p:sp>
+        <p:nvSpPr>
+          <p:cNvPr id="12" name="TextBox 11">
+            <a:extLst>
+              <a:ext uri="{FF2B5EF4-FFF2-40B4-BE49-F238E27FC236}">
+                <a16:creationId xmlns:a16="http://schemas.microsoft.com/office/drawing/2014/main" id="{E10052D5-6B20-2C06-C088-759BFFAFEB60}"/>
+              </a:ext>
+            </a:extLst>
+          </p:cNvPr>
+          <p:cNvSpPr txBox="1"/>
+          <p:nvPr/>
+        </p:nvSpPr>
+        <p:spPr>
+          <a:xfrm>
+            <a:off x="6460603" y="2559178"/>
+            <a:ext cx="4768769" cy="646331"/>
+          </a:xfrm>
+          <a:prstGeom prst="rect">
+            <a:avLst/>
+          </a:prstGeom>
+          <a:noFill/>
+        </p:spPr>
+        <p:txBody>
+          <a:bodyPr wrap="square" rtlCol="0">
+            <a:spAutoFit/>
+          </a:bodyPr>
+          <a:lstStyle/>
+          <a:p>
+            <a:r>
+              <a:rPr lang="en-US" u="sng"/>
+              <a:t>Total</a:t>
+            </a:r>
+            <a:r>
+              <a:rPr lang="en-US"/>
+              <a:t>: 285,339 rows. Avg 80.6 encounters per patient. Median 48 encounters per patient</a:t>
+            </a:r>
+          </a:p>
+        </p:txBody>
+      </p:sp>
+      <p:sp>
+        <p:nvSpPr>
+          <p:cNvPr id="13" name="TextBox 12">
+            <a:extLst>
+              <a:ext uri="{FF2B5EF4-FFF2-40B4-BE49-F238E27FC236}">
+                <a16:creationId xmlns:a16="http://schemas.microsoft.com/office/drawing/2014/main" id="{FB211479-1265-83D9-8563-E2DD6374172F}"/>
+              </a:ext>
+            </a:extLst>
+          </p:cNvPr>
+          <p:cNvSpPr txBox="1"/>
+          <p:nvPr/>
+        </p:nvSpPr>
+        <p:spPr>
+          <a:xfrm>
+            <a:off x="925974" y="2559178"/>
+            <a:ext cx="4768769" cy="646331"/>
+          </a:xfrm>
+          <a:prstGeom prst="rect">
+            <a:avLst/>
+          </a:prstGeom>
+          <a:noFill/>
+        </p:spPr>
+        <p:txBody>
+          <a:bodyPr wrap="square" rtlCol="0">
+            <a:spAutoFit/>
+          </a:bodyPr>
+          <a:lstStyle/>
+          <a:p>
+            <a:r>
+              <a:rPr lang="en-US" u="sng"/>
+              <a:t>Total</a:t>
+            </a:r>
+            <a:r>
+              <a:rPr lang="en-US"/>
+              <a:t>: 1480409 rows. Avg 418 encounters per patient. Median 242 encounters per patient.</a:t>
+            </a:r>
+          </a:p>
+        </p:txBody>
+      </p:sp>
+    </p:spTree>
+    <p:extLst>
+      <p:ext uri="{BB962C8B-B14F-4D97-AF65-F5344CB8AC3E}">
+        <p14:creationId xmlns:p14="http://schemas.microsoft.com/office/powerpoint/2010/main" val="1812317739"/>
+      </p:ext>
+    </p:extLst>
+  </p:cSld>
+  <p:clrMapOvr>
+    <a:masterClrMapping/>
+  </p:clrMapOvr>
+</p:sld>
+</file>
+
+<file path=ppt/slides/slide3.xml><?xml version="1.0" encoding="utf-8"?>
+<p:sld xmlns:a="http://schemas.openxmlformats.org/drawingml/2006/main" xmlns:r="http://schemas.openxmlformats.org/officeDocument/2006/relationships" xmlns:p="http://schemas.openxmlformats.org/presentationml/2006/main">
+  <p:cSld>
+    <p:spTree>
+      <p:nvGrpSpPr>
+        <p:cNvPr id="1" name="">
+          <a:extLst>
+            <a:ext uri="{FF2B5EF4-FFF2-40B4-BE49-F238E27FC236}">
+              <a16:creationId xmlns:a16="http://schemas.microsoft.com/office/drawing/2014/main" id="{D53AE1C3-6C69-551C-FD51-8F83DDE919ED}"/>
+            </a:ext>
+          </a:extLst>
+        </p:cNvPr>
+        <p:cNvGrpSpPr/>
+        <p:nvPr/>
+      </p:nvGrpSpPr>
+      <p:grpSpPr>
+        <a:xfrm>
+          <a:off x="0" y="0"/>
+          <a:ext cx="0" cy="0"/>
+          <a:chOff x="0" y="0"/>
+          <a:chExt cx="0" cy="0"/>
+        </a:xfrm>
+      </p:grpSpPr>
+      <p:sp>
+        <p:nvSpPr>
+          <p:cNvPr id="4" name="Rounded Rectangle 3">
+            <a:extLst>
+              <a:ext uri="{FF2B5EF4-FFF2-40B4-BE49-F238E27FC236}">
+                <a16:creationId xmlns:a16="http://schemas.microsoft.com/office/drawing/2014/main" id="{5D226746-C0A4-9809-5913-39A7BA676172}"/>
+              </a:ext>
+            </a:extLst>
+          </p:cNvPr>
+          <p:cNvSpPr/>
+          <p:nvPr/>
+        </p:nvSpPr>
+        <p:spPr>
+          <a:xfrm>
+            <a:off x="694481" y="300941"/>
+            <a:ext cx="5231757" cy="6192455"/>
+          </a:xfrm>
+          <a:prstGeom prst="roundRect">
+            <a:avLst>
+              <a:gd name="adj" fmla="val 4708"/>
+            </a:avLst>
+          </a:prstGeom>
+          <a:solidFill>
+            <a:schemeClr val="accent4">
+              <a:lumMod val="20000"/>
+              <a:lumOff val="80000"/>
+            </a:schemeClr>
+          </a:solidFill>
+          <a:ln>
+            <a:solidFill>
+              <a:schemeClr val="accent4">
+                <a:lumMod val="60000"/>
+                <a:lumOff val="40000"/>
+              </a:schemeClr>
+            </a:solidFill>
+          </a:ln>
+        </p:spPr>
+        <p:style>
+          <a:lnRef idx="2">
+            <a:schemeClr val="accent1">
+              <a:shade val="15000"/>
+            </a:schemeClr>
+          </a:lnRef>
+          <a:fillRef idx="1">
+            <a:schemeClr val="accent1"/>
+          </a:fillRef>
+          <a:effectRef idx="0">
+            <a:schemeClr val="accent1"/>
+          </a:effectRef>
+          <a:fontRef idx="minor">
+            <a:schemeClr val="lt1"/>
+          </a:fontRef>
+        </p:style>
+        <p:txBody>
+          <a:bodyPr rtlCol="0" anchor="ctr"/>
+          <a:lstStyle/>
+          <a:p>
+            <a:pPr algn="ctr"/>
+            <a:endParaRPr lang="en-US"/>
+          </a:p>
+        </p:txBody>
+      </p:sp>
+      <p:sp>
+        <p:nvSpPr>
+          <p:cNvPr id="5" name="Rounded Rectangle 4">
+            <a:extLst>
+              <a:ext uri="{FF2B5EF4-FFF2-40B4-BE49-F238E27FC236}">
+                <a16:creationId xmlns:a16="http://schemas.microsoft.com/office/drawing/2014/main" id="{2674BDDA-7487-E4A0-12FC-12046B6B2DB5}"/>
+              </a:ext>
+            </a:extLst>
+          </p:cNvPr>
+          <p:cNvSpPr/>
+          <p:nvPr/>
+        </p:nvSpPr>
+        <p:spPr>
+          <a:xfrm>
+            <a:off x="6229109" y="332772"/>
+            <a:ext cx="5231757" cy="6192455"/>
+          </a:xfrm>
+          <a:prstGeom prst="roundRect">
+            <a:avLst>
+              <a:gd name="adj" fmla="val 4708"/>
+            </a:avLst>
+          </a:prstGeom>
+          <a:solidFill>
+            <a:schemeClr val="accent6">
+              <a:lumMod val="20000"/>
+              <a:lumOff val="80000"/>
+            </a:schemeClr>
+          </a:solidFill>
+          <a:ln>
+            <a:solidFill>
+              <a:schemeClr val="accent6">
+                <a:lumMod val="60000"/>
+                <a:lumOff val="40000"/>
+              </a:schemeClr>
+            </a:solidFill>
+          </a:ln>
+        </p:spPr>
+        <p:style>
+          <a:lnRef idx="2">
+            <a:schemeClr val="accent1">
+              <a:shade val="15000"/>
+            </a:schemeClr>
+          </a:lnRef>
+          <a:fillRef idx="1">
+            <a:schemeClr val="accent1"/>
+          </a:fillRef>
+          <a:effectRef idx="0">
+            <a:schemeClr val="accent1"/>
+          </a:effectRef>
+          <a:fontRef idx="minor">
+            <a:schemeClr val="lt1"/>
+          </a:fontRef>
+        </p:style>
+        <p:txBody>
+          <a:bodyPr rtlCol="0" anchor="ctr"/>
+          <a:lstStyle/>
+          <a:p>
+            <a:pPr algn="ctr"/>
+            <a:endParaRPr lang="en-US"/>
+          </a:p>
+        </p:txBody>
+      </p:sp>
+      <p:sp>
+        <p:nvSpPr>
+          <p:cNvPr id="6" name="TextBox 5">
+            <a:extLst>
+              <a:ext uri="{FF2B5EF4-FFF2-40B4-BE49-F238E27FC236}">
+                <a16:creationId xmlns:a16="http://schemas.microsoft.com/office/drawing/2014/main" id="{FB14AC32-A0ED-D2C2-85ED-AC1592D1B14E}"/>
+              </a:ext>
+            </a:extLst>
+          </p:cNvPr>
+          <p:cNvSpPr txBox="1"/>
+          <p:nvPr/>
+        </p:nvSpPr>
+        <p:spPr>
+          <a:xfrm>
+            <a:off x="856527" y="509286"/>
+            <a:ext cx="1589987" cy="369332"/>
+          </a:xfrm>
+          <a:prstGeom prst="rect">
+            <a:avLst/>
+          </a:prstGeom>
+          <a:noFill/>
+        </p:spPr>
+        <p:txBody>
+          <a:bodyPr wrap="none" rtlCol="0">
+            <a:spAutoFit/>
+          </a:bodyPr>
+          <a:lstStyle/>
+          <a:p>
+            <a:r>
+              <a:rPr lang="en-US" b="1"/>
+              <a:t>Observations</a:t>
+            </a:r>
+          </a:p>
+        </p:txBody>
+      </p:sp>
+      <p:sp>
+        <p:nvSpPr>
+          <p:cNvPr id="7" name="TextBox 6">
+            <a:extLst>
+              <a:ext uri="{FF2B5EF4-FFF2-40B4-BE49-F238E27FC236}">
+                <a16:creationId xmlns:a16="http://schemas.microsoft.com/office/drawing/2014/main" id="{3DE8D60B-8211-4C3C-84AC-9BC3AEDD48E6}"/>
+              </a:ext>
+            </a:extLst>
+          </p:cNvPr>
+          <p:cNvSpPr txBox="1"/>
+          <p:nvPr/>
+        </p:nvSpPr>
+        <p:spPr>
+          <a:xfrm>
+            <a:off x="6460603" y="509286"/>
+            <a:ext cx="1388329" cy="369332"/>
+          </a:xfrm>
+          <a:prstGeom prst="rect">
+            <a:avLst/>
+          </a:prstGeom>
+          <a:noFill/>
+        </p:spPr>
+        <p:txBody>
+          <a:bodyPr wrap="none" rtlCol="0">
+            <a:spAutoFit/>
+          </a:bodyPr>
+          <a:lstStyle/>
+          <a:p>
+            <a:r>
+              <a:rPr lang="en-US" b="1"/>
+              <a:t>Encounters</a:t>
+            </a:r>
+          </a:p>
+        </p:txBody>
+      </p:sp>
       <p:pic>
         <p:nvPicPr>
-          <p:cNvPr id="11" name="Content Placeholder 10" descr="A graph of a number of encounters&#10;&#10;AI-generated content may be incorrect.">
-            <a:extLst>
-              <a:ext uri="{FF2B5EF4-FFF2-40B4-BE49-F238E27FC236}">
-                <a16:creationId xmlns:a16="http://schemas.microsoft.com/office/drawing/2014/main" id="{55DCAF7D-310C-AD27-5EC9-EA1291A07111}"/>
+          <p:cNvPr id="10" name="Picture 9" descr="A graph of a graph of a number of individuals&#10;&#10;AI-generated content may be incorrect.">
+            <a:extLst>
+              <a:ext uri="{FF2B5EF4-FFF2-40B4-BE49-F238E27FC236}">
+                <a16:creationId xmlns:a16="http://schemas.microsoft.com/office/drawing/2014/main" id="{A9EFF9E8-5D86-6EF6-D961-E9CF81FA99A9}"/>
               </a:ext>
             </a:extLst>
           </p:cNvPr>
           <p:cNvPicPr>
-            <a:picLocks noGrp="1" noChangeAspect="1"/>
+            <a:picLocks noChangeAspect="1"/>
           </p:cNvPicPr>
-          <p:nvPr>
-            <p:ph idx="1"/>
-          </p:nvPr>
+          <p:nvPr/>
         </p:nvPicPr>
         <p:blipFill>
           <a:blip r:embed="rId2"/>
@@ -3408,17 +3999,20 @@
         </p:blipFill>
         <p:spPr>
           <a:xfrm>
-            <a:off x="623213" y="329334"/>
-            <a:ext cx="5154374" cy="4351338"/>
+            <a:off x="6580918" y="878618"/>
+            <a:ext cx="4462693" cy="2661958"/>
           </a:xfrm>
+          <a:prstGeom prst="rect">
+            <a:avLst/>
+          </a:prstGeom>
         </p:spPr>
       </p:pic>
       <p:pic>
         <p:nvPicPr>
-          <p:cNvPr id="13" name="Picture 12" descr="A graph of a number of encounters before first cvd event&#10;&#10;AI-generated content may be incorrect.">
-            <a:extLst>
-              <a:ext uri="{FF2B5EF4-FFF2-40B4-BE49-F238E27FC236}">
-                <a16:creationId xmlns:a16="http://schemas.microsoft.com/office/drawing/2014/main" id="{238566CA-A378-A9B5-F3C8-7F05D4BEA6D0}"/>
+          <p:cNvPr id="15" name="Picture 14" descr="A graph of a number of encounters before first cvd&#10;&#10;AI-generated content may be incorrect.">
+            <a:extLst>
+              <a:ext uri="{FF2B5EF4-FFF2-40B4-BE49-F238E27FC236}">
+                <a16:creationId xmlns:a16="http://schemas.microsoft.com/office/drawing/2014/main" id="{62FD4709-83AE-6FFE-9081-55885B7E4010}"/>
               </a:ext>
             </a:extLst>
           </p:cNvPr>
@@ -3435,20 +4029,80 @@
         </p:blipFill>
         <p:spPr>
           <a:xfrm>
-            <a:off x="6289963" y="329334"/>
-            <a:ext cx="5154374" cy="4351338"/>
+            <a:off x="6580916" y="3686756"/>
+            <a:ext cx="4462695" cy="2661958"/>
           </a:xfrm>
           <a:prstGeom prst="rect">
             <a:avLst/>
           </a:prstGeom>
         </p:spPr>
       </p:pic>
-      <p:sp>
-        <p:nvSpPr>
-          <p:cNvPr id="14" name="TextBox 13">
-            <a:extLst>
-              <a:ext uri="{FF2B5EF4-FFF2-40B4-BE49-F238E27FC236}">
-                <a16:creationId xmlns:a16="http://schemas.microsoft.com/office/drawing/2014/main" id="{5BE6D745-6DE1-F395-5C76-452AAB7CC30A}"/>
+      <p:pic>
+        <p:nvPicPr>
+          <p:cNvPr id="18" name="Picture 17">
+            <a:extLst>
+              <a:ext uri="{FF2B5EF4-FFF2-40B4-BE49-F238E27FC236}">
+                <a16:creationId xmlns:a16="http://schemas.microsoft.com/office/drawing/2014/main" id="{982AF933-93CF-F00A-79B7-5F42BD8FC202}"/>
+              </a:ext>
+            </a:extLst>
+          </p:cNvPr>
+          <p:cNvPicPr>
+            <a:picLocks noChangeAspect="1"/>
+          </p:cNvPicPr>
+          <p:nvPr/>
+        </p:nvPicPr>
+        <p:blipFill>
+          <a:blip r:embed="rId4"/>
+          <a:stretch>
+            <a:fillRect/>
+          </a:stretch>
+        </p:blipFill>
+        <p:spPr>
+          <a:xfrm>
+            <a:off x="1079012" y="878619"/>
+            <a:ext cx="4462693" cy="2661957"/>
+          </a:xfrm>
+          <a:prstGeom prst="rect">
+            <a:avLst/>
+          </a:prstGeom>
+        </p:spPr>
+      </p:pic>
+      <p:pic>
+        <p:nvPicPr>
+          <p:cNvPr id="20" name="Picture 19">
+            <a:extLst>
+              <a:ext uri="{FF2B5EF4-FFF2-40B4-BE49-F238E27FC236}">
+                <a16:creationId xmlns:a16="http://schemas.microsoft.com/office/drawing/2014/main" id="{1E25DE62-9432-25B8-500A-B22A6057C5D3}"/>
+              </a:ext>
+            </a:extLst>
+          </p:cNvPr>
+          <p:cNvPicPr>
+            <a:picLocks noChangeAspect="1"/>
+          </p:cNvPicPr>
+          <p:nvPr/>
+        </p:nvPicPr>
+        <p:blipFill>
+          <a:blip r:embed="rId5"/>
+          <a:stretch>
+            <a:fillRect/>
+          </a:stretch>
+        </p:blipFill>
+        <p:spPr>
+          <a:xfrm>
+            <a:off x="1079012" y="3686007"/>
+            <a:ext cx="4462692" cy="2661957"/>
+          </a:xfrm>
+          <a:prstGeom prst="rect">
+            <a:avLst/>
+          </a:prstGeom>
+        </p:spPr>
+      </p:pic>
+      <p:sp>
+        <p:nvSpPr>
+          <p:cNvPr id="21" name="TextBox 20">
+            <a:extLst>
+              <a:ext uri="{FF2B5EF4-FFF2-40B4-BE49-F238E27FC236}">
+                <a16:creationId xmlns:a16="http://schemas.microsoft.com/office/drawing/2014/main" id="{87DE5DC0-176E-F194-1E7C-0C043BE839E3}"/>
               </a:ext>
             </a:extLst>
           </p:cNvPr>
@@ -3457,8 +4111,8 @@
         </p:nvSpPr>
         <p:spPr>
           <a:xfrm>
-            <a:off x="623213" y="5051338"/>
-            <a:ext cx="5002017" cy="1477328"/>
+            <a:off x="1551007" y="1024049"/>
+            <a:ext cx="1529586" cy="646331"/>
           </a:xfrm>
           <a:prstGeom prst="rect">
             <a:avLst/>
@@ -3466,38 +4120,147 @@
           <a:noFill/>
         </p:spPr>
         <p:txBody>
-          <a:bodyPr wrap="square" rtlCol="0">
+          <a:bodyPr wrap="none" rtlCol="0">
             <a:spAutoFit/>
           </a:bodyPr>
           <a:lstStyle/>
           <a:p>
             <a:r>
               <a:rPr lang="en-US"/>
-              <a:t>Mean: 50.64</a:t>
-            </a:r>
-          </a:p>
-          <a:p>
+              <a:t>Mean: 2100</a:t>
+            </a:r>
+          </a:p>
+          <a:p>
+            <a:r>
+              <a:rPr lang="en-US"/>
+              <a:t>Median: 2283</a:t>
+            </a:r>
+          </a:p>
+        </p:txBody>
+      </p:sp>
+      <p:sp>
+        <p:nvSpPr>
+          <p:cNvPr id="22" name="TextBox 21">
+            <a:extLst>
+              <a:ext uri="{FF2B5EF4-FFF2-40B4-BE49-F238E27FC236}">
+                <a16:creationId xmlns:a16="http://schemas.microsoft.com/office/drawing/2014/main" id="{73BBFFA7-C1AA-5764-59D3-A68648C04813}"/>
+              </a:ext>
+            </a:extLst>
+          </p:cNvPr>
+          <p:cNvSpPr txBox="1"/>
+          <p:nvPr/>
+        </p:nvSpPr>
+        <p:spPr>
+          <a:xfrm>
+            <a:off x="4025635" y="3795088"/>
+            <a:ext cx="1406154" cy="646331"/>
+          </a:xfrm>
+          <a:prstGeom prst="rect">
+            <a:avLst/>
+          </a:prstGeom>
+          <a:noFill/>
+        </p:spPr>
+        <p:txBody>
+          <a:bodyPr wrap="none" rtlCol="0">
+            <a:spAutoFit/>
+          </a:bodyPr>
+          <a:lstStyle/>
+          <a:p>
+            <a:pPr algn="r"/>
+            <a:r>
+              <a:rPr lang="en-US"/>
+              <a:t>Mean: 257</a:t>
+            </a:r>
+          </a:p>
+          <a:p>
+            <a:pPr algn="r"/>
+            <a:r>
+              <a:rPr lang="en-US"/>
+              <a:t>Median: 138</a:t>
+            </a:r>
+          </a:p>
+        </p:txBody>
+      </p:sp>
+      <p:sp>
+        <p:nvSpPr>
+          <p:cNvPr id="23" name="TextBox 22">
+            <a:extLst>
+              <a:ext uri="{FF2B5EF4-FFF2-40B4-BE49-F238E27FC236}">
+                <a16:creationId xmlns:a16="http://schemas.microsoft.com/office/drawing/2014/main" id="{1BFF59DD-77A0-7972-6ED2-B881BF26912E}"/>
+              </a:ext>
+            </a:extLst>
+          </p:cNvPr>
+          <p:cNvSpPr txBox="1"/>
+          <p:nvPr/>
+        </p:nvSpPr>
+        <p:spPr>
+          <a:xfrm>
+            <a:off x="7022423" y="1024048"/>
+            <a:ext cx="1653017" cy="646331"/>
+          </a:xfrm>
+          <a:prstGeom prst="rect">
+            <a:avLst/>
+          </a:prstGeom>
+          <a:noFill/>
+        </p:spPr>
+        <p:txBody>
+          <a:bodyPr wrap="none" rtlCol="0">
+            <a:spAutoFit/>
+          </a:bodyPr>
+          <a:lstStyle/>
+          <a:p>
+            <a:r>
+              <a:rPr lang="en-US"/>
+              <a:t>Mean: 16883</a:t>
+            </a:r>
+          </a:p>
+          <a:p>
+            <a:r>
+              <a:rPr lang="en-US"/>
+              <a:t>Median: 17570</a:t>
+            </a:r>
+          </a:p>
+        </p:txBody>
+      </p:sp>
+      <p:sp>
+        <p:nvSpPr>
+          <p:cNvPr id="24" name="TextBox 23">
+            <a:extLst>
+              <a:ext uri="{FF2B5EF4-FFF2-40B4-BE49-F238E27FC236}">
+                <a16:creationId xmlns:a16="http://schemas.microsoft.com/office/drawing/2014/main" id="{D4DCB9F2-87F8-6735-1752-9CDC59C66563}"/>
+              </a:ext>
+            </a:extLst>
+          </p:cNvPr>
+          <p:cNvSpPr txBox="1"/>
+          <p:nvPr/>
+        </p:nvSpPr>
+        <p:spPr>
+          <a:xfrm>
+            <a:off x="9664386" y="3795087"/>
+            <a:ext cx="1282723" cy="646331"/>
+          </a:xfrm>
+          <a:prstGeom prst="rect">
+            <a:avLst/>
+          </a:prstGeom>
+          <a:noFill/>
+        </p:spPr>
+        <p:txBody>
+          <a:bodyPr wrap="none" rtlCol="0">
+            <a:spAutoFit/>
+          </a:bodyPr>
+          <a:lstStyle/>
+          <a:p>
+            <a:pPr algn="r"/>
+            <a:r>
+              <a:rPr lang="en-US"/>
+              <a:t>Mean: 50</a:t>
+            </a:r>
+          </a:p>
+          <a:p>
+            <a:pPr algn="r"/>
             <a:r>
               <a:rPr lang="en-US"/>
               <a:t>Median: 27</a:t>
-            </a:r>
-          </a:p>
-          <a:p>
-            <a:r>
-              <a:rPr lang="en-US"/>
-              <a:t>Median</a:t>
-            </a:r>
-          </a:p>
-          <a:p>
-            <a:r>
-              <a:rPr lang="en-US"/>
-              <a:t>Min: 1</a:t>
-            </a:r>
-          </a:p>
-          <a:p>
-            <a:r>
-              <a:rPr lang="en-US"/>
-              <a:t>Max: 1594</a:t>
             </a:r>
           </a:p>
         </p:txBody>
@@ -3505,7 +4268,102 @@
     </p:spTree>
     <p:extLst>
       <p:ext uri="{BB962C8B-B14F-4D97-AF65-F5344CB8AC3E}">
-        <p14:creationId xmlns:p14="http://schemas.microsoft.com/office/powerpoint/2010/main" val="168162601"/>
+        <p14:creationId xmlns:p14="http://schemas.microsoft.com/office/powerpoint/2010/main" val="2314665796"/>
+      </p:ext>
+    </p:extLst>
+  </p:cSld>
+  <p:clrMapOvr>
+    <a:masterClrMapping/>
+  </p:clrMapOvr>
+</p:sld>
+</file>
+
+<file path=ppt/slides/slide4.xml><?xml version="1.0" encoding="utf-8"?>
+<p:sld xmlns:a="http://schemas.openxmlformats.org/drawingml/2006/main" xmlns:r="http://schemas.openxmlformats.org/officeDocument/2006/relationships" xmlns:p="http://schemas.openxmlformats.org/presentationml/2006/main">
+  <p:cSld>
+    <p:spTree>
+      <p:nvGrpSpPr>
+        <p:cNvPr id="1" name=""/>
+        <p:cNvGrpSpPr/>
+        <p:nvPr/>
+      </p:nvGrpSpPr>
+      <p:grpSpPr>
+        <a:xfrm>
+          <a:off x="0" y="0"/>
+          <a:ext cx="0" cy="0"/>
+          <a:chOff x="0" y="0"/>
+          <a:chExt cx="0" cy="0"/>
+        </a:xfrm>
+      </p:grpSpPr>
+      <p:sp>
+        <p:nvSpPr>
+          <p:cNvPr id="2" name="Title 1">
+            <a:extLst>
+              <a:ext uri="{FF2B5EF4-FFF2-40B4-BE49-F238E27FC236}">
+                <a16:creationId xmlns:a16="http://schemas.microsoft.com/office/drawing/2014/main" id="{54370811-3852-1A36-FAF1-716A9FFC3230}"/>
+              </a:ext>
+            </a:extLst>
+          </p:cNvPr>
+          <p:cNvSpPr>
+            <a:spLocks noGrp="1"/>
+          </p:cNvSpPr>
+          <p:nvPr>
+            <p:ph type="title"/>
+          </p:nvPr>
+        </p:nvSpPr>
+        <p:spPr>
+          <a:xfrm>
+            <a:off x="333415" y="1337399"/>
+            <a:ext cx="4706073" cy="1325563"/>
+          </a:xfrm>
+        </p:spPr>
+        <p:txBody>
+          <a:bodyPr>
+            <a:normAutofit fontScale="90000"/>
+          </a:bodyPr>
+          <a:lstStyle/>
+          <a:p>
+            <a:r>
+              <a:rPr lang="en-US" sz="3000"/>
+              <a:t>Not all patients will have every observation – should we make a cutoff of patient coverage for an observation to be included?</a:t>
+            </a:r>
+          </a:p>
+        </p:txBody>
+      </p:sp>
+      <p:pic>
+        <p:nvPicPr>
+          <p:cNvPr id="5" name="Picture 4" descr="A graph of a number of patients with a given observation&#10;&#10;AI-generated content may be incorrect.">
+            <a:extLst>
+              <a:ext uri="{FF2B5EF4-FFF2-40B4-BE49-F238E27FC236}">
+                <a16:creationId xmlns:a16="http://schemas.microsoft.com/office/drawing/2014/main" id="{1A1F4B6D-4053-1059-4E53-DB70E8F7B48E}"/>
+              </a:ext>
+            </a:extLst>
+          </p:cNvPr>
+          <p:cNvPicPr>
+            <a:picLocks noChangeAspect="1"/>
+          </p:cNvPicPr>
+          <p:nvPr/>
+        </p:nvPicPr>
+        <p:blipFill>
+          <a:blip r:embed="rId2"/>
+          <a:stretch>
+            <a:fillRect/>
+          </a:stretch>
+        </p:blipFill>
+        <p:spPr>
+          <a:xfrm>
+            <a:off x="101921" y="2865216"/>
+            <a:ext cx="4695029" cy="2655385"/>
+          </a:xfrm>
+          <a:prstGeom prst="rect">
+            <a:avLst/>
+          </a:prstGeom>
+        </p:spPr>
+      </p:pic>
+    </p:spTree>
+    <p:extLst>
+      <p:ext uri="{BB962C8B-B14F-4D97-AF65-F5344CB8AC3E}">
+        <p14:creationId xmlns:p14="http://schemas.microsoft.com/office/powerpoint/2010/main" val="1677911509"/>
       </p:ext>
     </p:extLst>
   </p:cSld>

</xml_diff>